<commit_message>
Added last slide to ML talk
</commit_message>
<xml_diff>
--- a/talks/ml.pptx
+++ b/talks/ml.pptx
@@ -18,6 +18,7 @@
     <p:sldId id="266" r:id="rId12"/>
     <p:sldId id="267" r:id="rId13"/>
     <p:sldId id="268" r:id="rId14"/>
+    <p:sldId id="269" r:id="rId15"/>
   </p:sldIdLst>
   <p:sldSz cx="9144000" cy="6858000" type="screen4x3"/>
   <p:notesSz cx="6858000" cy="9144000"/>
@@ -8935,6 +8936,139 @@
 </p:sld>
 </file>
 
+<file path=ppt/slides/slide14.xml><?xml version="1.0" encoding="utf-8"?>
+<p:sld xmlns:a="http://schemas.openxmlformats.org/drawingml/2006/main" xmlns:r="http://schemas.openxmlformats.org/officeDocument/2006/relationships" xmlns:p="http://schemas.openxmlformats.org/presentationml/2006/main">
+  <p:cSld>
+    <p:spTree>
+      <p:nvGrpSpPr>
+        <p:cNvPr id="1" name=""/>
+        <p:cNvGrpSpPr/>
+        <p:nvPr/>
+      </p:nvGrpSpPr>
+      <p:grpSpPr>
+        <a:xfrm>
+          <a:off x="0" y="0"/>
+          <a:ext cx="0" cy="0"/>
+          <a:chOff x="0" y="0"/>
+          <a:chExt cx="0" cy="0"/>
+        </a:xfrm>
+      </p:grpSpPr>
+      <p:sp>
+        <p:nvSpPr>
+          <p:cNvPr id="2" name="Title 1"/>
+          <p:cNvSpPr>
+            <a:spLocks noGrp="1"/>
+          </p:cNvSpPr>
+          <p:nvPr>
+            <p:ph type="title"/>
+          </p:nvPr>
+        </p:nvSpPr>
+        <p:spPr/>
+        <p:txBody>
+          <a:bodyPr/>
+          <a:lstStyle/>
+          <a:p>
+            <a:r>
+              <a:rPr lang="en-US" dirty="0" smtClean="0"/>
+              <a:t>More Things to Try</a:t>
+            </a:r>
+            <a:endParaRPr lang="en-US" dirty="0"/>
+          </a:p>
+        </p:txBody>
+      </p:sp>
+      <p:sp>
+        <p:nvSpPr>
+          <p:cNvPr id="3" name="Content Placeholder 2"/>
+          <p:cNvSpPr>
+            <a:spLocks noGrp="1"/>
+          </p:cNvSpPr>
+          <p:nvPr>
+            <p:ph idx="1"/>
+          </p:nvPr>
+        </p:nvSpPr>
+        <p:spPr/>
+        <p:txBody>
+          <a:bodyPr/>
+          <a:lstStyle/>
+          <a:p>
+            <a:r>
+              <a:rPr lang="en-US" dirty="0" smtClean="0"/>
+              <a:t>See if you can figure out what the rest of the perceptron code is doing</a:t>
+            </a:r>
+          </a:p>
+          <a:p>
+            <a:pPr lvl="1"/>
+            <a:r>
+              <a:rPr lang="en-US" dirty="0" smtClean="0"/>
+              <a:t>I’ve commented most of it</a:t>
+            </a:r>
+          </a:p>
+          <a:p>
+            <a:r>
+              <a:rPr lang="en-US" dirty="0" smtClean="0"/>
+              <a:t>Alter the code to work with a different dataset</a:t>
+            </a:r>
+          </a:p>
+          <a:p>
+            <a:pPr lvl="1"/>
+            <a:r>
+              <a:rPr lang="en-US" dirty="0" smtClean="0"/>
+              <a:t>You will probably have to change some numbers at least</a:t>
+            </a:r>
+          </a:p>
+          <a:p>
+            <a:r>
+              <a:rPr lang="en-US" dirty="0" smtClean="0"/>
+              <a:t>Practice more things in R</a:t>
+            </a:r>
+          </a:p>
+          <a:p>
+            <a:pPr lvl="1"/>
+            <a:r>
+              <a:rPr lang="en-US" dirty="0">
+                <a:hlinkClick r:id="rId2"/>
+              </a:rPr>
+              <a:t>https://www.statmethods.net/r-tutorial/</a:t>
+            </a:r>
+            <a:r>
+              <a:rPr lang="en-US" dirty="0" smtClean="0">
+                <a:hlinkClick r:id="rId2"/>
+              </a:rPr>
+              <a:t>index.html</a:t>
+            </a:r>
+            <a:endParaRPr lang="en-US" dirty="0" smtClean="0"/>
+          </a:p>
+          <a:p>
+            <a:pPr lvl="1"/>
+            <a:r>
+              <a:rPr lang="en-US" dirty="0">
+                <a:hlinkClick r:id="rId3"/>
+              </a:rPr>
+              <a:t>https://www.cyclismo.org/tutorial/R</a:t>
+            </a:r>
+            <a:r>
+              <a:rPr lang="en-US" dirty="0" smtClean="0">
+                <a:hlinkClick r:id="rId3"/>
+              </a:rPr>
+              <a:t>/</a:t>
+            </a:r>
+            <a:endParaRPr lang="en-US" dirty="0" smtClean="0"/>
+          </a:p>
+        </p:txBody>
+      </p:sp>
+    </p:spTree>
+    <p:extLst>
+      <p:ext uri="{BB962C8B-B14F-4D97-AF65-F5344CB8AC3E}">
+        <p14:creationId xmlns:p14="http://schemas.microsoft.com/office/powerpoint/2010/main" val="780035367"/>
+      </p:ext>
+    </p:extLst>
+  </p:cSld>
+  <p:clrMapOvr>
+    <a:masterClrMapping/>
+  </p:clrMapOvr>
+</p:sld>
+</file>
+
 <file path=ppt/slides/slide2.xml><?xml version="1.0" encoding="utf-8"?>
 <p:sld xmlns:a="http://schemas.openxmlformats.org/drawingml/2006/main" xmlns:r="http://schemas.openxmlformats.org/officeDocument/2006/relationships" xmlns:p="http://schemas.openxmlformats.org/presentationml/2006/main">
   <p:cSld>

</xml_diff>